<commit_message>
modified:   Presentation/Project1_Aw_Boon_Jun.pdf 	modified:   Presentation/Project1_Aw_Boon_Jun.pptx
</commit_message>
<xml_diff>
--- a/Presentation/Project1_Aw_Boon_Jun.pptx
+++ b/Presentation/Project1_Aw_Boon_Jun.pptx
@@ -110,13 +110,18 @@
       </a:defRPr>
     </a:lvl9pPr>
   </p:defaultTextStyle>
+  <p:extLst>
+    <p:ext uri="{EFAFB233-063F-42B5-8137-9DF3F51BA10A}">
+      <p15:sldGuideLst xmlns:p15="http://schemas.microsoft.com/office/powerpoint/2012/main"/>
+    </p:ext>
+  </p:extLst>
 </p:presentation>
 </file>
 
 <file path=ppt/revisionInfo.xml><?xml version="1.0" encoding="utf-8"?>
 <p1510:revInfo xmlns:a="http://schemas.openxmlformats.org/drawingml/2006/main" xmlns:r="http://schemas.openxmlformats.org/officeDocument/2006/relationships" xmlns:p1510="http://schemas.microsoft.com/office/powerpoint/2015/10/main">
   <p1510:revLst>
-    <p1510:client id="{5013E6BB-A084-4502-BCFA-88930F1AE279}" v="2" dt="2019-12-19T18:32:49.824"/>
+    <p1510:client id="{5013E6BB-A084-4502-BCFA-88930F1AE279}" v="4" dt="2019-12-20T03:44:01.308"/>
   </p1510:revLst>
 </p1510:revInfo>
 </file>
@@ -126,22 +131,53 @@
   <pc:docChgLst>
     <pc:chgData name="Boon Jun" userId="b9b2384c46af58b4" providerId="LiveId" clId="{5013E6BB-A084-4502-BCFA-88930F1AE279}"/>
     <pc:docChg chg="modSld">
-      <pc:chgData name="Boon Jun" userId="b9b2384c46af58b4" providerId="LiveId" clId="{5013E6BB-A084-4502-BCFA-88930F1AE279}" dt="2019-12-19T18:32:49.824" v="1" actId="207"/>
+      <pc:chgData name="Boon Jun" userId="b9b2384c46af58b4" providerId="LiveId" clId="{5013E6BB-A084-4502-BCFA-88930F1AE279}" dt="2019-12-20T03:44:33.748" v="21" actId="14100"/>
       <pc:docMkLst>
         <pc:docMk/>
       </pc:docMkLst>
       <pc:sldChg chg="modSp">
-        <pc:chgData name="Boon Jun" userId="b9b2384c46af58b4" providerId="LiveId" clId="{5013E6BB-A084-4502-BCFA-88930F1AE279}" dt="2019-12-19T18:32:49.824" v="1" actId="207"/>
+        <pc:chgData name="Boon Jun" userId="b9b2384c46af58b4" providerId="LiveId" clId="{5013E6BB-A084-4502-BCFA-88930F1AE279}" dt="2019-12-20T03:44:01.308" v="3" actId="1076"/>
+        <pc:sldMkLst>
+          <pc:docMk/>
+          <pc:sldMk cId="675594107" sldId="256"/>
+        </pc:sldMkLst>
+        <pc:picChg chg="mod">
+          <ac:chgData name="Boon Jun" userId="b9b2384c46af58b4" providerId="LiveId" clId="{5013E6BB-A084-4502-BCFA-88930F1AE279}" dt="2019-12-20T03:44:01.308" v="3" actId="1076"/>
+          <ac:picMkLst>
+            <pc:docMk/>
+            <pc:sldMk cId="675594107" sldId="256"/>
+            <ac:picMk id="1026" creationId="{7B45A46C-40F6-409E-ADC5-E33DA41B8AF0}"/>
+          </ac:picMkLst>
+        </pc:picChg>
+      </pc:sldChg>
+      <pc:sldChg chg="modSp">
+        <pc:chgData name="Boon Jun" userId="b9b2384c46af58b4" providerId="LiveId" clId="{5013E6BB-A084-4502-BCFA-88930F1AE279}" dt="2019-12-20T03:44:33.748" v="21" actId="14100"/>
         <pc:sldMkLst>
           <pc:docMk/>
           <pc:sldMk cId="3115965061" sldId="261"/>
         </pc:sldMkLst>
+        <pc:spChg chg="mod">
+          <ac:chgData name="Boon Jun" userId="b9b2384c46af58b4" providerId="LiveId" clId="{5013E6BB-A084-4502-BCFA-88930F1AE279}" dt="2019-12-20T03:44:04.969" v="4" actId="20577"/>
+          <ac:spMkLst>
+            <pc:docMk/>
+            <pc:sldMk cId="3115965061" sldId="261"/>
+            <ac:spMk id="5" creationId="{1628C2A3-3038-4499-A88C-6F8B93DD4A95}"/>
+          </ac:spMkLst>
+        </pc:spChg>
         <pc:spChg chg="mod">
           <ac:chgData name="Boon Jun" userId="b9b2384c46af58b4" providerId="LiveId" clId="{5013E6BB-A084-4502-BCFA-88930F1AE279}" dt="2019-12-19T18:32:49.824" v="1" actId="207"/>
           <ac:spMkLst>
             <pc:docMk/>
             <pc:sldMk cId="3115965061" sldId="261"/>
             <ac:spMk id="14" creationId="{894A6BCD-2592-4A1D-B10B-9FC187FC25CF}"/>
+          </ac:spMkLst>
+        </pc:spChg>
+        <pc:spChg chg="mod">
+          <ac:chgData name="Boon Jun" userId="b9b2384c46af58b4" providerId="LiveId" clId="{5013E6BB-A084-4502-BCFA-88930F1AE279}" dt="2019-12-20T03:44:33.748" v="21" actId="14100"/>
+          <ac:spMkLst>
+            <pc:docMk/>
+            <pc:sldMk cId="3115965061" sldId="261"/>
+            <ac:spMk id="15" creationId="{A1ABE131-64BE-433E-9896-6AE9E11F5344}"/>
           </ac:spMkLst>
         </pc:spChg>
         <pc:picChg chg="mod">
@@ -5826,7 +5862,7 @@
                 </a:solidFill>
                 <a:latin typeface="Gotham Black" panose="02000603040000020004" pitchFamily="2" charset="0"/>
               </a:rPr>
-              <a:t>CONCLUSIONS &amp;</a:t>
+              <a:t>CONCLUSION &amp;</a:t>
             </a:r>
           </a:p>
           <a:p>
@@ -6149,8 +6185,8 @@
         </p:nvSpPr>
         <p:spPr>
           <a:xfrm>
-            <a:off x="4763542" y="2138647"/>
-            <a:ext cx="5118740" cy="1290353"/>
+            <a:off x="4763541" y="2138647"/>
+            <a:ext cx="7151707" cy="874855"/>
           </a:xfrm>
           <a:prstGeom prst="rect">
             <a:avLst/>
@@ -6196,7 +6232,7 @@
                 <a:latin typeface="Gotham Book" pitchFamily="50" charset="0"/>
                 <a:cs typeface="Gotham Book" pitchFamily="50" charset="0"/>
               </a:rPr>
-              <a:t>Low SAT participation rate in both 2017 &amp; 2018</a:t>
+              <a:t>Low SAT participation rate in both 2017 (2%) &amp; 2018 (3%) </a:t>
             </a:r>
           </a:p>
         </p:txBody>

</xml_diff>